<commit_message>
updates to schematic, layout & Board Physical Plan
</commit_message>
<xml_diff>
--- a/Files_for_TestPlan_BoardPhysicalPlan/Board_Physical_Plan_stac_pcb.pptx
+++ b/Files_for_TestPlan_BoardPhysicalPlan/Board_Physical_Plan_stac_pcb.pptx
@@ -8106,7 +8106,7 @@
           <p:nvPr>
             <p:extLst>
               <p:ext uri="{D42A27DB-BD31-4B8C-83A1-F6EECF244321}">
-                <p14:modId xmlns:p14="http://schemas.microsoft.com/office/powerpoint/2010/main" val="743243892"/>
+                <p14:modId xmlns:p14="http://schemas.microsoft.com/office/powerpoint/2010/main" val="2388150921"/>
               </p:ext>
             </p:extLst>
           </p:nvPr>
@@ -8178,15 +8178,7 @@
                       </a:pPr>
                       <a:r>
                         <a:rPr lang="en-US" sz="1000" dirty="0"/>
-                        <a:t>Rogers RO4350B - top dielectric, </a:t>
-                      </a:r>
-                      <a:r>
-                        <a:rPr lang="en-US" sz="1000" dirty="0" err="1"/>
-                        <a:t>othw</a:t>
-                      </a:r>
-                      <a:r>
-                        <a:rPr lang="en-US" sz="1000" dirty="0"/>
-                        <a:t> FR4</a:t>
+                        <a:t>FR4</a:t>
                       </a:r>
                       <a:endParaRPr sz="1000" dirty="0"/>
                     </a:p>
@@ -8239,7 +8231,7 @@
                       </a:pPr>
                       <a:r>
                         <a:rPr lang="en-US" sz="1000" dirty="0"/>
-                        <a:t>Yes, size TODO</a:t>
+                        <a:t>Yes, 3/8”</a:t>
                       </a:r>
                       <a:endParaRPr sz="1000" dirty="0"/>
                     </a:p>
@@ -8671,7 +8663,7 @@
                       </a:pPr>
                       <a:r>
                         <a:rPr lang="en-US" sz="1000" dirty="0"/>
-                        <a:t>No</a:t>
+                        <a:t>Yes</a:t>
                       </a:r>
                       <a:endParaRPr sz="1000" dirty="0"/>
                     </a:p>
@@ -9543,8 +9535,8 @@
         </p:nvSpPr>
         <p:spPr>
           <a:xfrm>
-            <a:off x="192024" y="2084832"/>
-            <a:ext cx="2512341" cy="1600438"/>
+            <a:off x="192024" y="1906406"/>
+            <a:ext cx="2512341" cy="2031325"/>
           </a:xfrm>
           <a:prstGeom prst="rect">
             <a:avLst/>
@@ -9559,7 +9551,7 @@
           <a:p>
             <a:r>
               <a:rPr lang="en-US" dirty="0"/>
-              <a:t>Main physical constraint: Have 2 PMOD headers (6x2 pins each) with a center-to-center pitch of 0.9”. These must be on one edge of the board and will directly plug in to an Arty A7-100T FPGA.</a:t>
+              <a:t>Main physical constraint: Have 2 PMOD headers (6x2 pins each) with a center-to-center pitch of 0.9”. These must be on one edge of the board and will directly plug in to an Arty A7-100T FPGA.  First PMOD header is 9/16” from the Arty top edge.</a:t>
             </a:r>
           </a:p>
         </p:txBody>
@@ -9599,41 +9591,36 @@
           </a:p>
         </p:txBody>
       </p:sp>
-      <p:sp>
-        <p:nvSpPr>
-          <p:cNvPr id="15" name="TextBox 14">
+      <p:pic>
+        <p:nvPicPr>
+          <p:cNvPr id="5" name="Picture 4">
             <a:extLst>
               <a:ext uri="{FF2B5EF4-FFF2-40B4-BE49-F238E27FC236}">
-                <a16:creationId xmlns:a16="http://schemas.microsoft.com/office/drawing/2014/main" id="{B57BAD18-1E46-14BE-9354-281BE59B1183}"/>
+                <a16:creationId xmlns:a16="http://schemas.microsoft.com/office/drawing/2014/main" id="{7985D0A3-0AA2-D083-6E28-E10CEC05B41A}"/>
               </a:ext>
             </a:extLst>
           </p:cNvPr>
-          <p:cNvSpPr txBox="1"/>
+          <p:cNvPicPr>
+            <a:picLocks noChangeAspect="1"/>
+          </p:cNvPicPr>
           <p:nvPr/>
-        </p:nvSpPr>
+        </p:nvPicPr>
+        <p:blipFill>
+          <a:blip r:embed="rId3"/>
+          <a:stretch>
+            <a:fillRect/>
+          </a:stretch>
+        </p:blipFill>
         <p:spPr>
           <a:xfrm>
-            <a:off x="4718304" y="1820778"/>
-            <a:ext cx="1773936" cy="307777"/>
+            <a:off x="2834924" y="650180"/>
+            <a:ext cx="6007324" cy="3832690"/>
           </a:xfrm>
           <a:prstGeom prst="rect">
             <a:avLst/>
           </a:prstGeom>
-          <a:noFill/>
         </p:spPr>
-        <p:txBody>
-          <a:bodyPr wrap="square" rtlCol="0">
-            <a:spAutoFit/>
-          </a:bodyPr>
-          <a:lstStyle/>
-          <a:p>
-            <a:r>
-              <a:rPr lang="en-US" dirty="0"/>
-              <a:t>TODO: picture</a:t>
-            </a:r>
-          </a:p>
-        </p:txBody>
-      </p:sp>
+      </p:pic>
     </p:spTree>
   </p:cSld>
   <p:clrMapOvr>

</xml_diff>

<commit_message>
Assigned footprint to new version of STAC chpi on schematic, updated pcb side
</commit_message>
<xml_diff>
--- a/Files_for_TestPlan_BoardPhysicalPlan/Board_Physical_Plan_stac_pcb.pptx
+++ b/Files_for_TestPlan_BoardPhysicalPlan/Board_Physical_Plan_stac_pcb.pptx
@@ -5,7 +5,7 @@
     <p:sldMasterId id="2147483659" r:id="rId1"/>
   </p:sldMasterIdLst>
   <p:notesMasterIdLst>
-    <p:notesMasterId r:id="rId10"/>
+    <p:notesMasterId r:id="rId11"/>
   </p:notesMasterIdLst>
   <p:sldIdLst>
     <p:sldId id="256" r:id="rId2"/>
@@ -15,7 +15,8 @@
     <p:sldId id="262" r:id="rId6"/>
     <p:sldId id="260" r:id="rId7"/>
     <p:sldId id="261" r:id="rId8"/>
-    <p:sldId id="263" r:id="rId9"/>
+    <p:sldId id="264" r:id="rId9"/>
+    <p:sldId id="263" r:id="rId10"/>
   </p:sldIdLst>
   <p:sldSz cx="9144000" cy="5143500" type="screen16x9"/>
   <p:notesSz cx="6858000" cy="9144000"/>
@@ -1437,6 +1438,115 @@
 </file>
 
 <file path=ppt/notesSlides/notesSlide8.xml><?xml version="1.0" encoding="utf-8"?>
+<p:notes xmlns:a="http://schemas.openxmlformats.org/drawingml/2006/main" xmlns:r="http://schemas.openxmlformats.org/officeDocument/2006/relationships" xmlns:p="http://schemas.openxmlformats.org/presentationml/2006/main" showMasterSp="0" showMasterPhAnim="0">
+  <p:cSld>
+    <p:spTree>
+      <p:nvGrpSpPr>
+        <p:cNvPr id="1" name="Shape 86"/>
+        <p:cNvGrpSpPr/>
+        <p:nvPr/>
+      </p:nvGrpSpPr>
+      <p:grpSpPr>
+        <a:xfrm>
+          <a:off x="0" y="0"/>
+          <a:ext cx="0" cy="0"/>
+          <a:chOff x="0" y="0"/>
+          <a:chExt cx="0" cy="0"/>
+        </a:xfrm>
+      </p:grpSpPr>
+      <p:sp>
+        <p:nvSpPr>
+          <p:cNvPr id="87" name="Google Shape;87;g24db61307f4_0_31:notes"/>
+          <p:cNvSpPr>
+            <a:spLocks noGrp="1" noRot="1" noChangeAspect="1"/>
+          </p:cNvSpPr>
+          <p:nvPr>
+            <p:ph type="sldImg" idx="2"/>
+          </p:nvPr>
+        </p:nvSpPr>
+        <p:spPr>
+          <a:xfrm>
+            <a:off x="381000" y="685800"/>
+            <a:ext cx="6096000" cy="3429000"/>
+          </a:xfrm>
+          <a:custGeom>
+            <a:avLst/>
+            <a:gdLst/>
+            <a:ahLst/>
+            <a:cxnLst/>
+            <a:rect l="l" t="t" r="r" b="b"/>
+            <a:pathLst>
+              <a:path w="120000" h="120000" extrusionOk="0">
+                <a:moveTo>
+                  <a:pt x="0" y="0"/>
+                </a:moveTo>
+                <a:lnTo>
+                  <a:pt x="120000" y="0"/>
+                </a:lnTo>
+                <a:lnTo>
+                  <a:pt x="120000" y="120000"/>
+                </a:lnTo>
+                <a:lnTo>
+                  <a:pt x="0" y="120000"/>
+                </a:lnTo>
+                <a:close/>
+              </a:path>
+            </a:pathLst>
+          </a:custGeom>
+        </p:spPr>
+      </p:sp>
+      <p:sp>
+        <p:nvSpPr>
+          <p:cNvPr id="88" name="Google Shape;88;g24db61307f4_0_31:notes"/>
+          <p:cNvSpPr txBox="1">
+            <a:spLocks noGrp="1"/>
+          </p:cNvSpPr>
+          <p:nvPr>
+            <p:ph type="body" idx="1"/>
+          </p:nvPr>
+        </p:nvSpPr>
+        <p:spPr>
+          <a:xfrm>
+            <a:off x="685800" y="4343400"/>
+            <a:ext cx="5486400" cy="4114800"/>
+          </a:xfrm>
+          <a:prstGeom prst="rect">
+            <a:avLst/>
+          </a:prstGeom>
+        </p:spPr>
+        <p:txBody>
+          <a:bodyPr spcFirstLastPara="1" wrap="square" lIns="91425" tIns="91425" rIns="91425" bIns="91425" anchor="t" anchorCtr="0">
+            <a:noAutofit/>
+          </a:bodyPr>
+          <a:lstStyle/>
+          <a:p>
+            <a:pPr marL="0" lvl="0" indent="0" algn="l" rtl="0">
+              <a:spcBef>
+                <a:spcPts val="0"/>
+              </a:spcBef>
+              <a:spcAft>
+                <a:spcPts val="0"/>
+              </a:spcAft>
+              <a:buNone/>
+            </a:pPr>
+            <a:endParaRPr/>
+          </a:p>
+        </p:txBody>
+      </p:sp>
+    </p:spTree>
+    <p:extLst>
+      <p:ext uri="{BB962C8B-B14F-4D97-AF65-F5344CB8AC3E}">
+        <p14:creationId xmlns:p14="http://schemas.microsoft.com/office/powerpoint/2010/main" val="3352204516"/>
+      </p:ext>
+    </p:extLst>
+  </p:cSld>
+  <p:clrMapOvr>
+    <a:masterClrMapping/>
+  </p:clrMapOvr>
+</p:notes>
+</file>
+
+<file path=ppt/notesSlides/notesSlide9.xml><?xml version="1.0" encoding="utf-8"?>
 <p:notes xmlns:a="http://schemas.openxmlformats.org/drawingml/2006/main" xmlns:r="http://schemas.openxmlformats.org/officeDocument/2006/relationships" xmlns:p="http://schemas.openxmlformats.org/presentationml/2006/main" showMasterSp="0" showMasterPhAnim="0">
   <p:cSld>
     <p:spTree>
@@ -7413,7 +7523,7 @@
           <p:nvPr>
             <p:extLst>
               <p:ext uri="{D42A27DB-BD31-4B8C-83A1-F6EECF244321}">
-                <p14:modId xmlns:p14="http://schemas.microsoft.com/office/powerpoint/2010/main" val="2296735272"/>
+                <p14:modId xmlns:p14="http://schemas.microsoft.com/office/powerpoint/2010/main" val="3603665770"/>
               </p:ext>
             </p:extLst>
           </p:nvPr>
@@ -7856,7 +7966,7 @@
                       </a:pPr>
                       <a:r>
                         <a:rPr lang="en-US" sz="1000" dirty="0"/>
-                        <a:t>No, from Beam On</a:t>
+                        <a:t>Yes</a:t>
                       </a:r>
                       <a:endParaRPr sz="1000" dirty="0"/>
                     </a:p>
@@ -7909,7 +8019,7 @@
                       </a:pPr>
                       <a:r>
                         <a:rPr lang="en-US" sz="1000" dirty="0"/>
-                        <a:t>Yes, from Beam On</a:t>
+                        <a:t>No</a:t>
                       </a:r>
                       <a:endParaRPr sz="1000" dirty="0"/>
                     </a:p>
@@ -8106,7 +8216,7 @@
           <p:nvPr>
             <p:extLst>
               <p:ext uri="{D42A27DB-BD31-4B8C-83A1-F6EECF244321}">
-                <p14:modId xmlns:p14="http://schemas.microsoft.com/office/powerpoint/2010/main" val="2388150921"/>
+                <p14:modId xmlns:p14="http://schemas.microsoft.com/office/powerpoint/2010/main" val="938575790"/>
               </p:ext>
             </p:extLst>
           </p:nvPr>
@@ -8178,7 +8288,7 @@
                       </a:pPr>
                       <a:r>
                         <a:rPr lang="en-US" sz="1000" dirty="0"/>
-                        <a:t>FR4</a:t>
+                        <a:t>Rogers RO4350B on top, other layers FR4</a:t>
                       </a:r>
                       <a:endParaRPr sz="1000" dirty="0"/>
                     </a:p>
@@ -9098,110 +9208,219 @@
           </a:p>
         </p:txBody>
       </p:sp>
-      <p:grpSp>
-        <p:nvGrpSpPr>
-          <p:cNvPr id="13" name="Group 12">
+      <p:pic>
+        <p:nvPicPr>
+          <p:cNvPr id="8" name="Picture 7">
             <a:extLst>
               <a:ext uri="{FF2B5EF4-FFF2-40B4-BE49-F238E27FC236}">
-                <a16:creationId xmlns:a16="http://schemas.microsoft.com/office/drawing/2014/main" id="{F2BF50BA-9FA4-8DEB-8B34-B222ECF5FAB7}"/>
+                <a16:creationId xmlns:a16="http://schemas.microsoft.com/office/drawing/2014/main" id="{064ACB53-0F49-8D91-32E7-6E65B5F8B4B9}"/>
               </a:ext>
             </a:extLst>
           </p:cNvPr>
-          <p:cNvGrpSpPr/>
+          <p:cNvPicPr>
+            <a:picLocks noChangeAspect="1"/>
+          </p:cNvPicPr>
           <p:nvPr/>
-        </p:nvGrpSpPr>
-        <p:grpSpPr>
+        </p:nvPicPr>
+        <p:blipFill>
+          <a:blip r:embed="rId3"/>
+          <a:stretch>
+            <a:fillRect/>
+          </a:stretch>
+        </p:blipFill>
+        <p:spPr>
           <a:xfrm>
-            <a:off x="2367420" y="326000"/>
-            <a:ext cx="4799368" cy="4779454"/>
-            <a:chOff x="2367420" y="209493"/>
-            <a:chExt cx="4799368" cy="4779454"/>
+            <a:off x="4270284" y="466026"/>
+            <a:ext cx="2005116" cy="4327954"/>
           </a:xfrm>
-        </p:grpSpPr>
-        <p:pic>
-          <p:nvPicPr>
-            <p:cNvPr id="4" name="Picture 3">
-              <a:extLst>
-                <a:ext uri="{FF2B5EF4-FFF2-40B4-BE49-F238E27FC236}">
-                  <a16:creationId xmlns:a16="http://schemas.microsoft.com/office/drawing/2014/main" id="{5256A5CA-BC3B-3B1D-83ED-25BACD67A711}"/>
-                </a:ext>
-              </a:extLst>
-            </p:cNvPr>
-            <p:cNvPicPr>
-              <a:picLocks noChangeAspect="1"/>
-            </p:cNvPicPr>
-            <p:nvPr/>
-          </p:nvPicPr>
-          <p:blipFill>
-            <a:blip r:embed="rId3"/>
-            <a:stretch>
-              <a:fillRect/>
-            </a:stretch>
-          </p:blipFill>
-          <p:spPr>
-            <a:xfrm rot="5400000">
-              <a:off x="2377377" y="199536"/>
-              <a:ext cx="4779454" cy="4799368"/>
-            </a:xfrm>
-            <a:prstGeom prst="rect">
-              <a:avLst/>
-            </a:prstGeom>
-          </p:spPr>
-        </p:pic>
-        <p:sp>
-          <p:nvSpPr>
-            <p:cNvPr id="5" name="Rectangle 4">
-              <a:extLst>
-                <a:ext uri="{FF2B5EF4-FFF2-40B4-BE49-F238E27FC236}">
-                  <a16:creationId xmlns:a16="http://schemas.microsoft.com/office/drawing/2014/main" id="{C0CBB27D-6AB7-9F90-4D20-EDCEF338B594}"/>
-                </a:ext>
-              </a:extLst>
-            </p:cNvPr>
-            <p:cNvSpPr/>
-            <p:nvPr/>
-          </p:nvSpPr>
-          <p:spPr>
-            <a:xfrm>
-              <a:off x="2393681" y="209493"/>
-              <a:ext cx="2601980" cy="2403078"/>
-            </a:xfrm>
-            <a:prstGeom prst="rect">
-              <a:avLst/>
-            </a:prstGeom>
+          <a:prstGeom prst="rect">
+            <a:avLst/>
+          </a:prstGeom>
+        </p:spPr>
+      </p:pic>
+      <p:pic>
+        <p:nvPicPr>
+          <p:cNvPr id="12" name="Picture 11">
+            <a:extLst>
+              <a:ext uri="{FF2B5EF4-FFF2-40B4-BE49-F238E27FC236}">
+                <a16:creationId xmlns:a16="http://schemas.microsoft.com/office/drawing/2014/main" id="{A3040763-A436-1B63-DFAE-C175226D8A44}"/>
+              </a:ext>
+            </a:extLst>
+          </p:cNvPr>
+          <p:cNvPicPr>
+            <a:picLocks noChangeAspect="1"/>
+          </p:cNvPicPr>
+          <p:nvPr/>
+        </p:nvPicPr>
+        <p:blipFill>
+          <a:blip r:embed="rId4"/>
+          <a:stretch>
+            <a:fillRect/>
+          </a:stretch>
+        </p:blipFill>
+        <p:spPr>
+          <a:xfrm>
+            <a:off x="2068468" y="443026"/>
+            <a:ext cx="2005116" cy="4379305"/>
+          </a:xfrm>
+          <a:prstGeom prst="rect">
+            <a:avLst/>
+          </a:prstGeom>
+        </p:spPr>
+      </p:pic>
+      <p:sp>
+        <p:nvSpPr>
+          <p:cNvPr id="14" name="Google Shape;85;p17">
+            <a:extLst>
+              <a:ext uri="{FF2B5EF4-FFF2-40B4-BE49-F238E27FC236}">
+                <a16:creationId xmlns:a16="http://schemas.microsoft.com/office/drawing/2014/main" id="{BDC48424-681B-D2C7-A6AD-4F773F5AC2DA}"/>
+              </a:ext>
+            </a:extLst>
+          </p:cNvPr>
+          <p:cNvSpPr txBox="1"/>
+          <p:nvPr/>
+        </p:nvSpPr>
+        <p:spPr>
+          <a:xfrm>
+            <a:off x="242270" y="49426"/>
+            <a:ext cx="7432500" cy="393600"/>
+          </a:xfrm>
+          <a:prstGeom prst="rect">
+            <a:avLst/>
+          </a:prstGeom>
+          <a:noFill/>
+          <a:ln>
             <a:noFill/>
-            <a:ln>
-              <a:solidFill>
-                <a:srgbClr val="FFFF00"/>
-              </a:solidFill>
-              <a:prstDash val="dash"/>
-            </a:ln>
-          </p:spPr>
-          <p:style>
-            <a:lnRef idx="2">
-              <a:schemeClr val="accent1">
-                <a:shade val="15000"/>
-              </a:schemeClr>
-            </a:lnRef>
-            <a:fillRef idx="1">
-              <a:schemeClr val="accent1"/>
-            </a:fillRef>
-            <a:effectRef idx="0">
-              <a:schemeClr val="accent1"/>
-            </a:effectRef>
-            <a:fontRef idx="minor">
-              <a:schemeClr val="lt1"/>
-            </a:fontRef>
-          </p:style>
-          <p:txBody>
-            <a:bodyPr rtlCol="0" anchor="ctr"/>
-            <a:lstStyle/>
-            <a:p>
-              <a:pPr algn="ctr"/>
-              <a:endParaRPr lang="en-US"/>
-            </a:p>
-          </p:txBody>
-        </p:sp>
-      </p:grpSp>
+          </a:ln>
+        </p:spPr>
+        <p:txBody>
+          <a:bodyPr spcFirstLastPara="1" wrap="square" lIns="91425" tIns="91425" rIns="91425" bIns="91425" anchor="t" anchorCtr="0">
+            <a:noAutofit/>
+          </a:bodyPr>
+          <a:lstStyle/>
+          <a:p>
+            <a:pPr marL="0" lvl="0" indent="0" algn="l" rtl="0">
+              <a:spcBef>
+                <a:spcPts val="0"/>
+              </a:spcBef>
+              <a:spcAft>
+                <a:spcPts val="0"/>
+              </a:spcAft>
+              <a:buNone/>
+            </a:pPr>
+            <a:r>
+              <a:rPr lang="en-US" sz="1000" dirty="0"/>
+              <a:t>Please paste a screenshot of the Altium schematic symbol you created for you die and saved to </a:t>
+            </a:r>
+            <a:r>
+              <a:rPr lang="en-US" sz="1000" dirty="0" err="1"/>
+              <a:t>BWRC.SchLib</a:t>
+            </a:r>
+            <a:r>
+              <a:rPr lang="en-US" sz="1000" dirty="0"/>
+              <a:t>:</a:t>
+            </a:r>
+            <a:endParaRPr sz="1000" dirty="0"/>
+          </a:p>
+        </p:txBody>
+      </p:sp>
+    </p:spTree>
+  </p:cSld>
+  <p:clrMapOvr>
+    <a:masterClrMapping/>
+  </p:clrMapOvr>
+</p:sld>
+</file>
+
+<file path=ppt/slides/slide8.xml><?xml version="1.0" encoding="utf-8"?>
+<p:sld xmlns:a="http://schemas.openxmlformats.org/drawingml/2006/main" xmlns:r="http://schemas.openxmlformats.org/officeDocument/2006/relationships" xmlns:p="http://schemas.openxmlformats.org/presentationml/2006/main">
+  <p:cSld>
+    <p:spTree>
+      <p:nvGrpSpPr>
+        <p:cNvPr id="1" name="Shape 89"/>
+        <p:cNvGrpSpPr/>
+        <p:nvPr/>
+      </p:nvGrpSpPr>
+      <p:grpSpPr>
+        <a:xfrm>
+          <a:off x="0" y="0"/>
+          <a:ext cx="0" cy="0"/>
+          <a:chOff x="0" y="0"/>
+          <a:chExt cx="0" cy="0"/>
+        </a:xfrm>
+      </p:grpSpPr>
+      <p:pic>
+        <p:nvPicPr>
+          <p:cNvPr id="8" name="Picture 7">
+            <a:extLst>
+              <a:ext uri="{FF2B5EF4-FFF2-40B4-BE49-F238E27FC236}">
+                <a16:creationId xmlns:a16="http://schemas.microsoft.com/office/drawing/2014/main" id="{CF293DCD-0C3E-1E79-FCEE-69699D7DA0BB}"/>
+              </a:ext>
+            </a:extLst>
+          </p:cNvPr>
+          <p:cNvPicPr>
+            <a:picLocks noChangeAspect="1"/>
+          </p:cNvPicPr>
+          <p:nvPr/>
+        </p:nvPicPr>
+        <p:blipFill>
+          <a:blip r:embed="rId3"/>
+          <a:stretch>
+            <a:fillRect/>
+          </a:stretch>
+        </p:blipFill>
+        <p:spPr>
+          <a:xfrm rot="5400000">
+            <a:off x="2131091" y="44158"/>
+            <a:ext cx="4881818" cy="5143500"/>
+          </a:xfrm>
+          <a:prstGeom prst="rect">
+            <a:avLst/>
+          </a:prstGeom>
+        </p:spPr>
+      </p:pic>
+      <p:sp>
+        <p:nvSpPr>
+          <p:cNvPr id="90" name="Google Shape;90;p18"/>
+          <p:cNvSpPr txBox="1">
+            <a:spLocks noGrp="1"/>
+          </p:cNvSpPr>
+          <p:nvPr>
+            <p:ph type="sldNum" idx="12"/>
+          </p:nvPr>
+        </p:nvSpPr>
+        <p:spPr>
+          <a:xfrm>
+            <a:off x="8472458" y="4663217"/>
+            <a:ext cx="548700" cy="393600"/>
+          </a:xfrm>
+          <a:prstGeom prst="rect">
+            <a:avLst/>
+          </a:prstGeom>
+        </p:spPr>
+        <p:txBody>
+          <a:bodyPr spcFirstLastPara="1" wrap="square" lIns="91425" tIns="91425" rIns="91425" bIns="91425" anchor="ctr" anchorCtr="0">
+            <a:normAutofit/>
+          </a:bodyPr>
+          <a:lstStyle/>
+          <a:p>
+            <a:pPr marL="0" lvl="0" indent="0" algn="r" rtl="0">
+              <a:spcBef>
+                <a:spcPts val="0"/>
+              </a:spcBef>
+              <a:spcAft>
+                <a:spcPts val="0"/>
+              </a:spcAft>
+              <a:buNone/>
+            </a:pPr>
+            <a:fld id="{00000000-1234-1234-1234-123412341234}" type="slidenum">
+              <a:rPr lang="en"/>
+              <a:t>8</a:t>
+            </a:fld>
+            <a:endParaRPr/>
+          </a:p>
+        </p:txBody>
+      </p:sp>
       <p:sp>
         <p:nvSpPr>
           <p:cNvPr id="2" name="TextBox 1">
@@ -9216,7 +9435,7 @@
         </p:nvSpPr>
         <p:spPr>
           <a:xfrm>
-            <a:off x="1862558" y="695509"/>
+            <a:off x="1467142" y="748466"/>
             <a:ext cx="504862" cy="261610"/>
           </a:xfrm>
           <a:prstGeom prst="rect">
@@ -9342,42 +9561,12 @@
           </a:p>
         </p:txBody>
       </p:sp>
-      <p:sp>
-        <p:nvSpPr>
-          <p:cNvPr id="6" name="TextBox 5">
-            <a:extLst>
-              <a:ext uri="{FF2B5EF4-FFF2-40B4-BE49-F238E27FC236}">
-                <a16:creationId xmlns:a16="http://schemas.microsoft.com/office/drawing/2014/main" id="{C77CC9BE-2072-D953-F124-DAE6DF3A4EFE}"/>
-              </a:ext>
-            </a:extLst>
-          </p:cNvPr>
-          <p:cNvSpPr txBox="1"/>
-          <p:nvPr/>
-        </p:nvSpPr>
-        <p:spPr>
-          <a:xfrm>
-            <a:off x="2420362" y="38046"/>
-            <a:ext cx="3379304" cy="307777"/>
-          </a:xfrm>
-          <a:prstGeom prst="rect">
-            <a:avLst/>
-          </a:prstGeom>
-          <a:noFill/>
-        </p:spPr>
-        <p:txBody>
-          <a:bodyPr wrap="square" rtlCol="0">
-            <a:spAutoFit/>
-          </a:bodyPr>
-          <a:lstStyle/>
-          <a:p>
-            <a:r>
-              <a:rPr lang="en-US" dirty="0"/>
-              <a:t>TODO: update pins</a:t>
-            </a:r>
-          </a:p>
-        </p:txBody>
-      </p:sp>
     </p:spTree>
+    <p:extLst>
+      <p:ext uri="{BB962C8B-B14F-4D97-AF65-F5344CB8AC3E}">
+        <p14:creationId xmlns:p14="http://schemas.microsoft.com/office/powerpoint/2010/main" val="3686813616"/>
+      </p:ext>
+    </p:extLst>
   </p:cSld>
   <p:clrMapOvr>
     <a:masterClrMapping/>
@@ -9385,7 +9574,7 @@
 </p:sld>
 </file>
 
-<file path=ppt/slides/slide8.xml><?xml version="1.0" encoding="utf-8"?>
+<file path=ppt/slides/slide9.xml><?xml version="1.0" encoding="utf-8"?>
 <p:sld xmlns:a="http://schemas.openxmlformats.org/drawingml/2006/main" xmlns:r="http://schemas.openxmlformats.org/officeDocument/2006/relationships" xmlns:p="http://schemas.openxmlformats.org/presentationml/2006/main">
   <p:cSld>
     <p:spTree>
@@ -9438,7 +9627,7 @@
             </a:pPr>
             <a:fld id="{00000000-1234-1234-1234-123412341234}" type="slidenum">
               <a:rPr lang="en"/>
-              <a:t>8</a:t>
+              <a:t>9</a:t>
             </a:fld>
             <a:endParaRPr/>
           </a:p>

</xml_diff>